<commit_message>
New file changes, last time for tonight
</commit_message>
<xml_diff>
--- a/Swolepatrol_prototype.pptx
+++ b/Swolepatrol_prototype.pptx
@@ -104,6 +104,11 @@
       </a:defRPr>
     </a:lvl9pPr>
   </p:defaultTextStyle>
+  <p:extLst>
+    <p:ext uri="{EFAFB233-063F-42B5-8137-9DF3F51BA10A}">
+      <p15:sldGuideLst xmlns:p15="http://schemas.microsoft.com/office/powerpoint/2012/main"/>
+    </p:ext>
+  </p:extLst>
 </p:presentation>
 </file>
 
@@ -3426,13 +3431,21 @@
           <a:p>
             <a:r>
               <a:rPr lang="en-US" dirty="0"/>
-              <a:t>App Prototype Link: </a:t>
-            </a:r>
-            <a:r>
-              <a:rPr lang="en-US" dirty="0">
+              <a:t>App </a:t>
+            </a:r>
+            <a:r>
+              <a:rPr lang="en-US"/>
+              <a:t>Prototype Link: </a:t>
+            </a:r>
+            <a:r>
+              <a:rPr lang="en-US">
                 <a:hlinkClick r:id="rId2"/>
               </a:rPr>
               <a:t>https://xd.adobe.com/view/39d4079c-bd87-40a3-6ff7-857e5f4c68e6-4fe5/?fullscreen&amp;hints=off</a:t>
+            </a:r>
+            <a:r>
+              <a:rPr lang="en-US"/>
+              <a:t> </a:t>
             </a:r>
             <a:endParaRPr lang="en-US" dirty="0"/>
           </a:p>

</xml_diff>